<commit_message>
Updated two labs to 16:9 slides and enlarged characters
</commit_message>
<xml_diff>
--- a/Application Level/LoadBalancerRandom/013-kathara-lab_loadbalancer-ws-rnd.pptx
+++ b/Application Level/LoadBalancerRandom/013-kathara-lab_loadbalancer-ws-rnd.pptx
@@ -164,6 +164,9 @@
         </p15:guide>
       </p15:sldGuideLst>
     </p:ext>
+    <p:ext uri="{2D200454-40CA-4A62-9FC3-DE9A4176ACB9}">
+      <p15:notesGuideLst xmlns:p15="http://schemas.microsoft.com/office/powerpoint/2012/main"/>
+    </p:ext>
   </p:extLst>
 </p:presentation>
 </file>
@@ -703,7 +706,7 @@
             </a:extLst>
           </p:cNvPr>
           <p:cNvSpPr>
-            <a:spLocks noRot="1" noChangeArrowheads="1" noTextEdit="1"/>
+            <a:spLocks noGrp="1" noRot="1" noChangeAspect="1" noChangeArrowheads="1" noTextEdit="1"/>
           </p:cNvSpPr>
           <p:nvPr>
             <p:ph type="sldImg" idx="2"/>
@@ -7559,8 +7562,8 @@
               <a:defRPr/>
             </a:pPr>
             <a:r>
-              <a:rPr lang="it-IT"/>
-              <a:t>Kathará - Introduction</a:t>
+              <a:rPr lang="en-US"/>
+              <a:t>kathara – [ lab: load balancer - web switch - random ]</a:t>
             </a:r>
             <a:endParaRPr lang="it-IT" dirty="0"/>
           </a:p>

</xml_diff>